<commit_message>
Finished round 2 of testing and validating (checkbox added)
</commit_message>
<xml_diff>
--- a/Presentation/AUTO MVP.pptx
+++ b/Presentation/AUTO MVP.pptx
@@ -116,6 +116,11 @@
       </a:defRPr>
     </a:lvl9pPr>
   </p:defaultTextStyle>
+  <p:extLst>
+    <p:ext uri="{EFAFB233-063F-42B5-8137-9DF3F51BA10A}">
+      <p15:sldGuideLst xmlns:p15="http://schemas.microsoft.com/office/powerpoint/2012/main"/>
+    </p:ext>
+  </p:extLst>
 </p:presentation>
 </file>
 
@@ -3410,6 +3415,108 @@
           </a:p>
         </p:txBody>
       </p:sp>
+      <p:sp>
+        <p:nvSpPr>
+          <p:cNvPr id="4" name="TextBox 3">
+            <a:extLst>
+              <a:ext uri="{FF2B5EF4-FFF2-40B4-BE49-F238E27FC236}">
+                <a16:creationId xmlns:a16="http://schemas.microsoft.com/office/drawing/2014/main" id="{60F19BC0-BCAD-8B1D-75AE-EFDF1A56FB39}"/>
+              </a:ext>
+            </a:extLst>
+          </p:cNvPr>
+          <p:cNvSpPr txBox="1"/>
+          <p:nvPr/>
+        </p:nvSpPr>
+        <p:spPr>
+          <a:xfrm>
+            <a:off x="10174942" y="6488668"/>
+            <a:ext cx="1497106" cy="369332"/>
+          </a:xfrm>
+          <a:prstGeom prst="rect">
+            <a:avLst/>
+          </a:prstGeom>
+          <a:noFill/>
+        </p:spPr>
+        <p:txBody>
+          <a:bodyPr wrap="square" rtlCol="0">
+            <a:spAutoFit/>
+          </a:bodyPr>
+          <a:lstStyle/>
+          <a:p>
+            <a:pPr algn="ctr"/>
+            <a:r>
+              <a:rPr lang="en-CA" dirty="0"/>
+              <a:t>Pietro Stolf</a:t>
+            </a:r>
+          </a:p>
+        </p:txBody>
+      </p:sp>
+      <p:pic>
+        <p:nvPicPr>
+          <p:cNvPr id="6" name="Picture 5">
+            <a:extLst>
+              <a:ext uri="{FF2B5EF4-FFF2-40B4-BE49-F238E27FC236}">
+                <a16:creationId xmlns:a16="http://schemas.microsoft.com/office/drawing/2014/main" id="{02901BD2-D280-3F5E-41D5-5A300530AA8B}"/>
+              </a:ext>
+            </a:extLst>
+          </p:cNvPr>
+          <p:cNvPicPr>
+            <a:picLocks noChangeAspect="1"/>
+          </p:cNvPicPr>
+          <p:nvPr/>
+        </p:nvPicPr>
+        <p:blipFill>
+          <a:blip r:embed="rId2"/>
+          <a:stretch>
+            <a:fillRect/>
+          </a:stretch>
+        </p:blipFill>
+        <p:spPr>
+          <a:xfrm>
+            <a:off x="11609296" y="6533615"/>
+            <a:ext cx="417571" cy="279438"/>
+          </a:xfrm>
+          <a:prstGeom prst="rect">
+            <a:avLst/>
+          </a:prstGeom>
+        </p:spPr>
+      </p:pic>
+      <p:pic>
+        <p:nvPicPr>
+          <p:cNvPr id="7" name="Picture 6">
+            <a:extLst>
+              <a:ext uri="{FF2B5EF4-FFF2-40B4-BE49-F238E27FC236}">
+                <a16:creationId xmlns:a16="http://schemas.microsoft.com/office/drawing/2014/main" id="{4CC6A50A-DCB2-C296-1D11-B5F8719A761C}"/>
+              </a:ext>
+            </a:extLst>
+          </p:cNvPr>
+          <p:cNvPicPr>
+            <a:picLocks noChangeAspect="1"/>
+          </p:cNvPicPr>
+          <p:nvPr/>
+        </p:nvPicPr>
+        <p:blipFill>
+          <a:blip r:embed="rId3">
+            <a:extLst>
+              <a:ext uri="{28A0092B-C50C-407E-A947-70E740481C1C}">
+                <a14:useLocalDpi xmlns:a14="http://schemas.microsoft.com/office/drawing/2010/main" val="0"/>
+              </a:ext>
+            </a:extLst>
+          </a:blip>
+          <a:stretch>
+            <a:fillRect/>
+          </a:stretch>
+        </p:blipFill>
+        <p:spPr>
+          <a:xfrm rot="2381443">
+            <a:off x="11869033" y="6408125"/>
+            <a:ext cx="317609" cy="274195"/>
+          </a:xfrm>
+          <a:prstGeom prst="rect">
+            <a:avLst/>
+          </a:prstGeom>
+        </p:spPr>
+      </p:pic>
     </p:spTree>
     <p:extLst>
       <p:ext uri="{BB962C8B-B14F-4D97-AF65-F5344CB8AC3E}">
@@ -3420,6 +3527,108 @@
   <p:clrMapOvr>
     <a:masterClrMapping/>
   </p:clrMapOvr>
+  <p:timing>
+    <p:tnLst>
+      <p:par>
+        <p:cTn id="1" dur="indefinite" restart="never" nodeType="tmRoot">
+          <p:childTnLst>
+            <p:seq concurrent="1" nextAc="seek">
+              <p:cTn id="2" dur="indefinite" nodeType="mainSeq">
+                <p:childTnLst>
+                  <p:par>
+                    <p:cTn id="3" fill="hold">
+                      <p:stCondLst>
+                        <p:cond delay="indefinite"/>
+                      </p:stCondLst>
+                      <p:childTnLst>
+                        <p:par>
+                          <p:cTn id="4" fill="hold">
+                            <p:stCondLst>
+                              <p:cond delay="0"/>
+                            </p:stCondLst>
+                            <p:childTnLst>
+                              <p:par>
+                                <p:cTn id="5" presetID="1" presetClass="entr" presetSubtype="0" fill="hold" nodeType="clickEffect">
+                                  <p:stCondLst>
+                                    <p:cond delay="0"/>
+                                  </p:stCondLst>
+                                  <p:childTnLst>
+                                    <p:set>
+                                      <p:cBhvr>
+                                        <p:cTn id="6" dur="1" fill="hold">
+                                          <p:stCondLst>
+                                            <p:cond delay="0"/>
+                                          </p:stCondLst>
+                                        </p:cTn>
+                                        <p:tgtEl>
+                                          <p:spTgt spid="7"/>
+                                        </p:tgtEl>
+                                        <p:attrNameLst>
+                                          <p:attrName>style.visibility</p:attrName>
+                                        </p:attrNameLst>
+                                      </p:cBhvr>
+                                      <p:to>
+                                        <p:strVal val="visible"/>
+                                      </p:to>
+                                    </p:set>
+                                  </p:childTnLst>
+                                </p:cTn>
+                              </p:par>
+                              <p:par>
+                                <p:cTn id="7" presetID="1" presetClass="entr" presetSubtype="0" fill="hold" nodeType="withEffect">
+                                  <p:stCondLst>
+                                    <p:cond delay="0"/>
+                                  </p:stCondLst>
+                                  <p:childTnLst>
+                                    <p:set>
+                                      <p:cBhvr>
+                                        <p:cTn id="8" dur="1" fill="hold">
+                                          <p:stCondLst>
+                                            <p:cond delay="0"/>
+                                          </p:stCondLst>
+                                        </p:cTn>
+                                        <p:tgtEl>
+                                          <p:spTgt spid="6"/>
+                                        </p:tgtEl>
+                                        <p:attrNameLst>
+                                          <p:attrName>style.visibility</p:attrName>
+                                        </p:attrNameLst>
+                                      </p:cBhvr>
+                                      <p:to>
+                                        <p:strVal val="visible"/>
+                                      </p:to>
+                                    </p:set>
+                                  </p:childTnLst>
+                                </p:cTn>
+                              </p:par>
+                            </p:childTnLst>
+                          </p:cTn>
+                        </p:par>
+                      </p:childTnLst>
+                    </p:cTn>
+                  </p:par>
+                </p:childTnLst>
+              </p:cTn>
+              <p:prevCondLst>
+                <p:cond evt="onPrev" delay="0">
+                  <p:tgtEl>
+                    <p:sldTgt/>
+                  </p:tgtEl>
+                </p:cond>
+              </p:prevCondLst>
+              <p:nextCondLst>
+                <p:cond evt="onNext" delay="0">
+                  <p:tgtEl>
+                    <p:sldTgt/>
+                  </p:tgtEl>
+                </p:cond>
+              </p:nextCondLst>
+            </p:seq>
+          </p:childTnLst>
+        </p:cTn>
+      </p:par>
+    </p:tnLst>
+  </p:timing>
 </p:sld>
 </file>
 
@@ -4551,6 +4760,41 @@
           </a:p>
         </p:txBody>
       </p:sp>
+      <p:sp>
+        <p:nvSpPr>
+          <p:cNvPr id="2" name="Title 1">
+            <a:extLst>
+              <a:ext uri="{FF2B5EF4-FFF2-40B4-BE49-F238E27FC236}">
+                <a16:creationId xmlns:a16="http://schemas.microsoft.com/office/drawing/2014/main" id="{62A13CEE-F232-F4CC-B970-8C3D068EEF1A}"/>
+              </a:ext>
+            </a:extLst>
+          </p:cNvPr>
+          <p:cNvSpPr>
+            <a:spLocks noGrp="1"/>
+          </p:cNvSpPr>
+          <p:nvPr>
+            <p:ph type="title"/>
+          </p:nvPr>
+        </p:nvSpPr>
+        <p:spPr>
+          <a:xfrm>
+            <a:off x="0" y="1"/>
+            <a:ext cx="3854824" cy="733364"/>
+          </a:xfrm>
+        </p:spPr>
+        <p:txBody>
+          <a:bodyPr>
+            <a:normAutofit/>
+          </a:bodyPr>
+          <a:lstStyle/>
+          <a:p>
+            <a:r>
+              <a:rPr lang="en-CA" sz="2800" dirty="0"/>
+              <a:t>Results – Price Predictor </a:t>
+            </a:r>
+          </a:p>
+        </p:txBody>
+      </p:sp>
     </p:spTree>
     <p:extLst>
       <p:ext uri="{BB962C8B-B14F-4D97-AF65-F5344CB8AC3E}">
@@ -4561,6 +4805,268 @@
   <p:clrMapOvr>
     <a:masterClrMapping/>
   </p:clrMapOvr>
+  <p:timing>
+    <p:tnLst>
+      <p:par>
+        <p:cTn id="1" dur="indefinite" restart="never" nodeType="tmRoot">
+          <p:childTnLst>
+            <p:seq concurrent="1" nextAc="seek">
+              <p:cTn id="2" dur="indefinite" nodeType="mainSeq">
+                <p:childTnLst>
+                  <p:par>
+                    <p:cTn id="3" fill="hold">
+                      <p:stCondLst>
+                        <p:cond delay="indefinite"/>
+                      </p:stCondLst>
+                      <p:childTnLst>
+                        <p:par>
+                          <p:cTn id="4" fill="hold">
+                            <p:stCondLst>
+                              <p:cond delay="0"/>
+                            </p:stCondLst>
+                            <p:childTnLst>
+                              <p:par>
+                                <p:cTn id="5" presetID="1" presetClass="entr" presetSubtype="0" fill="hold" nodeType="clickEffect">
+                                  <p:stCondLst>
+                                    <p:cond delay="0"/>
+                                  </p:stCondLst>
+                                  <p:childTnLst>
+                                    <p:set>
+                                      <p:cBhvr>
+                                        <p:cTn id="6" dur="1" fill="hold">
+                                          <p:stCondLst>
+                                            <p:cond delay="0"/>
+                                          </p:stCondLst>
+                                        </p:cTn>
+                                        <p:tgtEl>
+                                          <p:spTgt spid="6"/>
+                                        </p:tgtEl>
+                                        <p:attrNameLst>
+                                          <p:attrName>style.visibility</p:attrName>
+                                        </p:attrNameLst>
+                                      </p:cBhvr>
+                                      <p:to>
+                                        <p:strVal val="visible"/>
+                                      </p:to>
+                                    </p:set>
+                                  </p:childTnLst>
+                                </p:cTn>
+                              </p:par>
+                              <p:par>
+                                <p:cTn id="7" presetID="1" presetClass="entr" presetSubtype="0" fill="hold" grpId="0" nodeType="withEffect">
+                                  <p:stCondLst>
+                                    <p:cond delay="0"/>
+                                  </p:stCondLst>
+                                  <p:childTnLst>
+                                    <p:set>
+                                      <p:cBhvr>
+                                        <p:cTn id="8" dur="1" fill="hold">
+                                          <p:stCondLst>
+                                            <p:cond delay="0"/>
+                                          </p:stCondLst>
+                                        </p:cTn>
+                                        <p:tgtEl>
+                                          <p:spTgt spid="11"/>
+                                        </p:tgtEl>
+                                        <p:attrNameLst>
+                                          <p:attrName>style.visibility</p:attrName>
+                                        </p:attrNameLst>
+                                      </p:cBhvr>
+                                      <p:to>
+                                        <p:strVal val="visible"/>
+                                      </p:to>
+                                    </p:set>
+                                  </p:childTnLst>
+                                </p:cTn>
+                              </p:par>
+                              <p:par>
+                                <p:cTn id="9" presetID="1" presetClass="entr" presetSubtype="0" fill="hold" grpId="0" nodeType="withEffect">
+                                  <p:stCondLst>
+                                    <p:cond delay="0"/>
+                                  </p:stCondLst>
+                                  <p:childTnLst>
+                                    <p:set>
+                                      <p:cBhvr>
+                                        <p:cTn id="10" dur="1" fill="hold">
+                                          <p:stCondLst>
+                                            <p:cond delay="0"/>
+                                          </p:stCondLst>
+                                        </p:cTn>
+                                        <p:tgtEl>
+                                          <p:spTgt spid="12"/>
+                                        </p:tgtEl>
+                                        <p:attrNameLst>
+                                          <p:attrName>style.visibility</p:attrName>
+                                        </p:attrNameLst>
+                                      </p:cBhvr>
+                                      <p:to>
+                                        <p:strVal val="visible"/>
+                                      </p:to>
+                                    </p:set>
+                                  </p:childTnLst>
+                                </p:cTn>
+                              </p:par>
+                              <p:par>
+                                <p:cTn id="11" presetID="1" presetClass="entr" presetSubtype="0" fill="hold" nodeType="withEffect">
+                                  <p:stCondLst>
+                                    <p:cond delay="0"/>
+                                  </p:stCondLst>
+                                  <p:childTnLst>
+                                    <p:set>
+                                      <p:cBhvr>
+                                        <p:cTn id="12" dur="1" fill="hold">
+                                          <p:stCondLst>
+                                            <p:cond delay="0"/>
+                                          </p:stCondLst>
+                                        </p:cTn>
+                                        <p:tgtEl>
+                                          <p:spTgt spid="7"/>
+                                        </p:tgtEl>
+                                        <p:attrNameLst>
+                                          <p:attrName>style.visibility</p:attrName>
+                                        </p:attrNameLst>
+                                      </p:cBhvr>
+                                      <p:to>
+                                        <p:strVal val="visible"/>
+                                      </p:to>
+                                    </p:set>
+                                  </p:childTnLst>
+                                </p:cTn>
+                              </p:par>
+                              <p:par>
+                                <p:cTn id="13" presetID="1" presetClass="entr" presetSubtype="0" fill="hold" grpId="0" nodeType="withEffect">
+                                  <p:stCondLst>
+                                    <p:cond delay="0"/>
+                                  </p:stCondLst>
+                                  <p:childTnLst>
+                                    <p:set>
+                                      <p:cBhvr>
+                                        <p:cTn id="14" dur="1" fill="hold">
+                                          <p:stCondLst>
+                                            <p:cond delay="0"/>
+                                          </p:stCondLst>
+                                        </p:cTn>
+                                        <p:tgtEl>
+                                          <p:spTgt spid="8"/>
+                                        </p:tgtEl>
+                                        <p:attrNameLst>
+                                          <p:attrName>style.visibility</p:attrName>
+                                        </p:attrNameLst>
+                                      </p:cBhvr>
+                                      <p:to>
+                                        <p:strVal val="visible"/>
+                                      </p:to>
+                                    </p:set>
+                                  </p:childTnLst>
+                                </p:cTn>
+                              </p:par>
+                              <p:par>
+                                <p:cTn id="15" presetID="1" presetClass="entr" presetSubtype="0" fill="hold" grpId="0" nodeType="withEffect">
+                                  <p:stCondLst>
+                                    <p:cond delay="0"/>
+                                  </p:stCondLst>
+                                  <p:childTnLst>
+                                    <p:set>
+                                      <p:cBhvr>
+                                        <p:cTn id="16" dur="1" fill="hold">
+                                          <p:stCondLst>
+                                            <p:cond delay="0"/>
+                                          </p:stCondLst>
+                                        </p:cTn>
+                                        <p:tgtEl>
+                                          <p:spTgt spid="9"/>
+                                        </p:tgtEl>
+                                        <p:attrNameLst>
+                                          <p:attrName>style.visibility</p:attrName>
+                                        </p:attrNameLst>
+                                      </p:cBhvr>
+                                      <p:to>
+                                        <p:strVal val="visible"/>
+                                      </p:to>
+                                    </p:set>
+                                  </p:childTnLst>
+                                </p:cTn>
+                              </p:par>
+                            </p:childTnLst>
+                          </p:cTn>
+                        </p:par>
+                      </p:childTnLst>
+                    </p:cTn>
+                  </p:par>
+                  <p:par>
+                    <p:cTn id="17" fill="hold">
+                      <p:stCondLst>
+                        <p:cond delay="indefinite"/>
+                      </p:stCondLst>
+                      <p:childTnLst>
+                        <p:par>
+                          <p:cTn id="18" fill="hold">
+                            <p:stCondLst>
+                              <p:cond delay="0"/>
+                            </p:stCondLst>
+                            <p:childTnLst>
+                              <p:par>
+                                <p:cTn id="19" presetID="1" presetClass="entr" presetSubtype="0" fill="hold" grpId="0" nodeType="clickEffect">
+                                  <p:stCondLst>
+                                    <p:cond delay="0"/>
+                                  </p:stCondLst>
+                                  <p:childTnLst>
+                                    <p:set>
+                                      <p:cBhvr>
+                                        <p:cTn id="20" dur="1" fill="hold">
+                                          <p:stCondLst>
+                                            <p:cond delay="0"/>
+                                          </p:stCondLst>
+                                        </p:cTn>
+                                        <p:tgtEl>
+                                          <p:spTgt spid="10"/>
+                                        </p:tgtEl>
+                                        <p:attrNameLst>
+                                          <p:attrName>style.visibility</p:attrName>
+                                        </p:attrNameLst>
+                                      </p:cBhvr>
+                                      <p:to>
+                                        <p:strVal val="visible"/>
+                                      </p:to>
+                                    </p:set>
+                                  </p:childTnLst>
+                                </p:cTn>
+                              </p:par>
+                            </p:childTnLst>
+                          </p:cTn>
+                        </p:par>
+                      </p:childTnLst>
+                    </p:cTn>
+                  </p:par>
+                </p:childTnLst>
+              </p:cTn>
+              <p:prevCondLst>
+                <p:cond evt="onPrev" delay="0">
+                  <p:tgtEl>
+                    <p:sldTgt/>
+                  </p:tgtEl>
+                </p:cond>
+              </p:prevCondLst>
+              <p:nextCondLst>
+                <p:cond evt="onNext" delay="0">
+                  <p:tgtEl>
+                    <p:sldTgt/>
+                  </p:tgtEl>
+                </p:cond>
+              </p:nextCondLst>
+            </p:seq>
+          </p:childTnLst>
+        </p:cTn>
+      </p:par>
+    </p:tnLst>
+    <p:bldLst>
+      <p:bldP spid="8" grpId="0"/>
+      <p:bldP spid="9" grpId="0"/>
+      <p:bldP spid="10" grpId="0"/>
+      <p:bldP spid="11" grpId="0"/>
+      <p:bldP spid="12" grpId="0"/>
+    </p:bldLst>
+  </p:timing>
 </p:sld>
 </file>
 

</xml_diff>